<commit_message>
Added codes and ppt for Loop control statements
</commit_message>
<xml_diff>
--- a/Loop_Control_Statements/cf_PPT.pptx
+++ b/Loop_Control_Statements/cf_PPT.pptx
@@ -267,7 +267,7 @@
           <a:p>
             <a:fld id="{3E967618-A4F3-45A6-8BCE-D2F29BC403E2}" type="datetimeFigureOut">
               <a:rPr lang="en-US" smtClean="0"/>
-              <a:t>11/11/2020</a:t>
+              <a:t>11/22/2020</a:t>
             </a:fld>
             <a:endParaRPr lang="en-US"/>
           </a:p>
@@ -465,7 +465,7 @@
           <a:p>
             <a:fld id="{3E967618-A4F3-45A6-8BCE-D2F29BC403E2}" type="datetimeFigureOut">
               <a:rPr lang="en-US" smtClean="0"/>
-              <a:t>11/11/2020</a:t>
+              <a:t>11/22/2020</a:t>
             </a:fld>
             <a:endParaRPr lang="en-US"/>
           </a:p>
@@ -673,7 +673,7 @@
           <a:p>
             <a:fld id="{3E967618-A4F3-45A6-8BCE-D2F29BC403E2}" type="datetimeFigureOut">
               <a:rPr lang="en-US" smtClean="0"/>
-              <a:t>11/11/2020</a:t>
+              <a:t>11/22/2020</a:t>
             </a:fld>
             <a:endParaRPr lang="en-US"/>
           </a:p>
@@ -871,7 +871,7 @@
           <a:p>
             <a:fld id="{3E967618-A4F3-45A6-8BCE-D2F29BC403E2}" type="datetimeFigureOut">
               <a:rPr lang="en-US" smtClean="0"/>
-              <a:t>11/11/2020</a:t>
+              <a:t>11/22/2020</a:t>
             </a:fld>
             <a:endParaRPr lang="en-US"/>
           </a:p>
@@ -1146,7 +1146,7 @@
           <a:p>
             <a:fld id="{3E967618-A4F3-45A6-8BCE-D2F29BC403E2}" type="datetimeFigureOut">
               <a:rPr lang="en-US" smtClean="0"/>
-              <a:t>11/11/2020</a:t>
+              <a:t>11/22/2020</a:t>
             </a:fld>
             <a:endParaRPr lang="en-US"/>
           </a:p>
@@ -1411,7 +1411,7 @@
           <a:p>
             <a:fld id="{3E967618-A4F3-45A6-8BCE-D2F29BC403E2}" type="datetimeFigureOut">
               <a:rPr lang="en-US" smtClean="0"/>
-              <a:t>11/11/2020</a:t>
+              <a:t>11/22/2020</a:t>
             </a:fld>
             <a:endParaRPr lang="en-US"/>
           </a:p>
@@ -1823,7 +1823,7 @@
           <a:p>
             <a:fld id="{3E967618-A4F3-45A6-8BCE-D2F29BC403E2}" type="datetimeFigureOut">
               <a:rPr lang="en-US" smtClean="0"/>
-              <a:t>11/11/2020</a:t>
+              <a:t>11/22/2020</a:t>
             </a:fld>
             <a:endParaRPr lang="en-US"/>
           </a:p>
@@ -1964,7 +1964,7 @@
           <a:p>
             <a:fld id="{3E967618-A4F3-45A6-8BCE-D2F29BC403E2}" type="datetimeFigureOut">
               <a:rPr lang="en-US" smtClean="0"/>
-              <a:t>11/11/2020</a:t>
+              <a:t>11/22/2020</a:t>
             </a:fld>
             <a:endParaRPr lang="en-US"/>
           </a:p>
@@ -2077,7 +2077,7 @@
           <a:p>
             <a:fld id="{3E967618-A4F3-45A6-8BCE-D2F29BC403E2}" type="datetimeFigureOut">
               <a:rPr lang="en-US" smtClean="0"/>
-              <a:t>11/11/2020</a:t>
+              <a:t>11/22/2020</a:t>
             </a:fld>
             <a:endParaRPr lang="en-US"/>
           </a:p>
@@ -2388,7 +2388,7 @@
           <a:p>
             <a:fld id="{3E967618-A4F3-45A6-8BCE-D2F29BC403E2}" type="datetimeFigureOut">
               <a:rPr lang="en-US" smtClean="0"/>
-              <a:t>11/11/2020</a:t>
+              <a:t>11/22/2020</a:t>
             </a:fld>
             <a:endParaRPr lang="en-US"/>
           </a:p>
@@ -2676,7 +2676,7 @@
           <a:p>
             <a:fld id="{3E967618-A4F3-45A6-8BCE-D2F29BC403E2}" type="datetimeFigureOut">
               <a:rPr lang="en-US" smtClean="0"/>
-              <a:t>11/11/2020</a:t>
+              <a:t>11/22/2020</a:t>
             </a:fld>
             <a:endParaRPr lang="en-US"/>
           </a:p>
@@ -2917,7 +2917,7 @@
           <a:p>
             <a:fld id="{3E967618-A4F3-45A6-8BCE-D2F29BC403E2}" type="datetimeFigureOut">
               <a:rPr lang="en-US" smtClean="0"/>
-              <a:t>11/11/2020</a:t>
+              <a:t>11/22/2020</a:t>
             </a:fld>
             <a:endParaRPr lang="en-US"/>
           </a:p>
@@ -3362,7 +3362,7 @@
         </p:blipFill>
         <p:spPr>
           <a:xfrm>
-            <a:off x="0" y="1673"/>
+            <a:off x="0" y="0"/>
             <a:ext cx="12192000" cy="6854653"/>
           </a:xfrm>
           <a:prstGeom prst="rect">
@@ -4841,7 +4841,7 @@
           <a:p>
             <a:r>
               <a:rPr lang="en-US" dirty="0"/>
-              <a:t>A label is a simple word is an identifier followed by a colon. It is applied to a statement or a block od code. Labels are mostly used when continue and break statements need to jump to certain block of code or to certain iterations.</a:t>
+              <a:t>A label in a simple word is an identifier followed by a colon. It is applied to a statement or a block of code. Labels are mostly used when continue and break statements need to jump to certain block of code or to certain iterations.</a:t>
             </a:r>
           </a:p>
         </p:txBody>

</xml_diff>